<commit_message>
Updated doc's global schemas about recall/migration
</commit_message>
<xml_diff>
--- a/castor/tape/tapeserver/documentation/images/MigrationMountMM.pptx
+++ b/castor/tape/tapeserver/documentation/images/MigrationMountMM.pptx
@@ -288,7 +288,7 @@
           <a:p>
             <a:fld id="{CBA86333-F23A-467F-8B51-1B0299BC507D}" type="datetimeFigureOut">
               <a:rPr lang="en-GB" smtClean="0"/>
-              <a:t>21/11/2013</a:t>
+              <a:t>04/06/2014</a:t>
             </a:fld>
             <a:endParaRPr lang="en-GB"/>
           </a:p>
@@ -458,7 +458,7 @@
           <a:p>
             <a:fld id="{CBA86333-F23A-467F-8B51-1B0299BC507D}" type="datetimeFigureOut">
               <a:rPr lang="en-GB" smtClean="0"/>
-              <a:t>21/11/2013</a:t>
+              <a:t>04/06/2014</a:t>
             </a:fld>
             <a:endParaRPr lang="en-GB"/>
           </a:p>
@@ -638,7 +638,7 @@
           <a:p>
             <a:fld id="{CBA86333-F23A-467F-8B51-1B0299BC507D}" type="datetimeFigureOut">
               <a:rPr lang="en-GB" smtClean="0"/>
-              <a:t>21/11/2013</a:t>
+              <a:t>04/06/2014</a:t>
             </a:fld>
             <a:endParaRPr lang="en-GB"/>
           </a:p>
@@ -808,7 +808,7 @@
           <a:p>
             <a:fld id="{CBA86333-F23A-467F-8B51-1B0299BC507D}" type="datetimeFigureOut">
               <a:rPr lang="en-GB" smtClean="0"/>
-              <a:t>21/11/2013</a:t>
+              <a:t>04/06/2014</a:t>
             </a:fld>
             <a:endParaRPr lang="en-GB"/>
           </a:p>
@@ -1054,7 +1054,7 @@
           <a:p>
             <a:fld id="{CBA86333-F23A-467F-8B51-1B0299BC507D}" type="datetimeFigureOut">
               <a:rPr lang="en-GB" smtClean="0"/>
-              <a:t>21/11/2013</a:t>
+              <a:t>04/06/2014</a:t>
             </a:fld>
             <a:endParaRPr lang="en-GB"/>
           </a:p>
@@ -1342,7 +1342,7 @@
           <a:p>
             <a:fld id="{CBA86333-F23A-467F-8B51-1B0299BC507D}" type="datetimeFigureOut">
               <a:rPr lang="en-GB" smtClean="0"/>
-              <a:t>21/11/2013</a:t>
+              <a:t>04/06/2014</a:t>
             </a:fld>
             <a:endParaRPr lang="en-GB"/>
           </a:p>
@@ -1769,7 +1769,7 @@
           <a:p>
             <a:fld id="{CBA86333-F23A-467F-8B51-1B0299BC507D}" type="datetimeFigureOut">
               <a:rPr lang="en-GB" smtClean="0"/>
-              <a:t>21/11/2013</a:t>
+              <a:t>04/06/2014</a:t>
             </a:fld>
             <a:endParaRPr lang="en-GB"/>
           </a:p>
@@ -1887,7 +1887,7 @@
           <a:p>
             <a:fld id="{CBA86333-F23A-467F-8B51-1B0299BC507D}" type="datetimeFigureOut">
               <a:rPr lang="en-GB" smtClean="0"/>
-              <a:t>21/11/2013</a:t>
+              <a:t>04/06/2014</a:t>
             </a:fld>
             <a:endParaRPr lang="en-GB"/>
           </a:p>
@@ -1982,7 +1982,7 @@
           <a:p>
             <a:fld id="{CBA86333-F23A-467F-8B51-1B0299BC507D}" type="datetimeFigureOut">
               <a:rPr lang="en-GB" smtClean="0"/>
-              <a:t>21/11/2013</a:t>
+              <a:t>04/06/2014</a:t>
             </a:fld>
             <a:endParaRPr lang="en-GB"/>
           </a:p>
@@ -2259,7 +2259,7 @@
           <a:p>
             <a:fld id="{CBA86333-F23A-467F-8B51-1B0299BC507D}" type="datetimeFigureOut">
               <a:rPr lang="en-GB" smtClean="0"/>
-              <a:t>21/11/2013</a:t>
+              <a:t>04/06/2014</a:t>
             </a:fld>
             <a:endParaRPr lang="en-GB"/>
           </a:p>
@@ -2512,7 +2512,7 @@
           <a:p>
             <a:fld id="{CBA86333-F23A-467F-8B51-1B0299BC507D}" type="datetimeFigureOut">
               <a:rPr lang="en-GB" smtClean="0"/>
-              <a:t>21/11/2013</a:t>
+              <a:t>04/06/2014</a:t>
             </a:fld>
             <a:endParaRPr lang="en-GB"/>
           </a:p>
@@ -2725,7 +2725,7 @@
           <a:p>
             <a:fld id="{CBA86333-F23A-467F-8B51-1B0299BC507D}" type="datetimeFigureOut">
               <a:rPr lang="en-GB" smtClean="0"/>
-              <a:t>21/11/2013</a:t>
+              <a:t>04/06/2014</a:t>
             </a:fld>
             <a:endParaRPr lang="en-GB"/>
           </a:p>
@@ -3939,11 +3939,7 @@
             </a:r>
             <a:r>
               <a:rPr lang="en-US" sz="800" b="1" smtClean="0"/>
-              <a:t>Mount </a:t>
-            </a:r>
-            <a:r>
-              <a:rPr lang="en-US" sz="800" b="1" smtClean="0"/>
-              <a:t>Manager </a:t>
+              <a:t>Mount Manager </a:t>
             </a:r>
             <a:r>
               <a:rPr lang="en-US" sz="800" b="1" dirty="0" smtClean="0"/>
@@ -10099,7 +10095,7 @@
         </p:nvGrpSpPr>
         <p:grpSpPr>
           <a:xfrm>
-            <a:off x="192185" y="6866010"/>
+            <a:off x="215300" y="6878051"/>
             <a:ext cx="180020" cy="180020"/>
             <a:chOff x="1035165" y="1170180"/>
             <a:chExt cx="180020" cy="180020"/>
@@ -10334,6 +10330,861 @@
                   <a:pt x="4103370" y="241307"/>
                   <a:pt x="4295775" y="659137"/>
                   <a:pt x="4488180" y="1076967"/>
+                </a:cubicBezTo>
+              </a:path>
+            </a:pathLst>
+          </a:custGeom>
+          <a:ln>
+            <a:tailEnd type="arrow"/>
+          </a:ln>
+        </p:spPr>
+        <p:style>
+          <a:lnRef idx="1">
+            <a:schemeClr val="accent1"/>
+          </a:lnRef>
+          <a:fillRef idx="0">
+            <a:schemeClr val="accent1"/>
+          </a:fillRef>
+          <a:effectRef idx="0">
+            <a:schemeClr val="accent1"/>
+          </a:effectRef>
+          <a:fontRef idx="minor">
+            <a:schemeClr val="tx1"/>
+          </a:fontRef>
+        </p:style>
+        <p:txBody>
+          <a:bodyPr rtlCol="0" anchor="ctr"/>
+          <a:lstStyle/>
+          <a:p>
+            <a:pPr algn="ctr"/>
+            <a:endParaRPr lang="en-GB">
+              <a:solidFill>
+                <a:schemeClr val="tx1"/>
+              </a:solidFill>
+            </a:endParaRPr>
+          </a:p>
+        </p:txBody>
+      </p:sp>
+      <p:sp>
+        <p:nvSpPr>
+          <p:cNvPr id="243" name="Rectangle 242"/>
+          <p:cNvSpPr/>
+          <p:nvPr/>
+        </p:nvSpPr>
+        <p:spPr>
+          <a:xfrm>
+            <a:off x="1430244" y="4773612"/>
+            <a:ext cx="1181561" cy="2221404"/>
+          </a:xfrm>
+          <a:prstGeom prst="rect">
+            <a:avLst/>
+          </a:prstGeom>
+          <a:noFill/>
+        </p:spPr>
+        <p:style>
+          <a:lnRef idx="2">
+            <a:schemeClr val="accent1">
+              <a:shade val="50000"/>
+            </a:schemeClr>
+          </a:lnRef>
+          <a:fillRef idx="1">
+            <a:schemeClr val="accent1"/>
+          </a:fillRef>
+          <a:effectRef idx="0">
+            <a:schemeClr val="accent1"/>
+          </a:effectRef>
+          <a:fontRef idx="minor">
+            <a:schemeClr val="lt1"/>
+          </a:fontRef>
+        </p:style>
+        <p:txBody>
+          <a:bodyPr rtlCol="0" anchor="ctr"/>
+          <a:lstStyle/>
+          <a:p>
+            <a:pPr algn="ctr"/>
+            <a:endParaRPr lang="en-GB"/>
+          </a:p>
+        </p:txBody>
+      </p:sp>
+      <p:sp>
+        <p:nvSpPr>
+          <p:cNvPr id="250" name="TextBox 249"/>
+          <p:cNvSpPr txBox="1"/>
+          <p:nvPr/>
+        </p:nvSpPr>
+        <p:spPr>
+          <a:xfrm>
+            <a:off x="1478485" y="4833087"/>
+            <a:ext cx="1151277" cy="215444"/>
+          </a:xfrm>
+          <a:prstGeom prst="rect">
+            <a:avLst/>
+          </a:prstGeom>
+          <a:noFill/>
+        </p:spPr>
+        <p:txBody>
+          <a:bodyPr wrap="none" rtlCol="0">
+            <a:spAutoFit/>
+          </a:bodyPr>
+          <a:lstStyle/>
+          <a:p>
+            <a:r>
+              <a:rPr lang="en-US" sz="800" b="1" dirty="0" smtClean="0"/>
+              <a:t>Global Status Reporter</a:t>
+            </a:r>
+            <a:endParaRPr lang="en-GB" sz="800" b="1" dirty="0"/>
+          </a:p>
+        </p:txBody>
+      </p:sp>
+      <p:sp>
+        <p:nvSpPr>
+          <p:cNvPr id="251" name="TextBox 250"/>
+          <p:cNvSpPr txBox="1"/>
+          <p:nvPr/>
+        </p:nvSpPr>
+        <p:spPr>
+          <a:xfrm>
+            <a:off x="1430244" y="6564607"/>
+            <a:ext cx="537327" cy="215444"/>
+          </a:xfrm>
+          <a:prstGeom prst="rect">
+            <a:avLst/>
+          </a:prstGeom>
+          <a:noFill/>
+        </p:spPr>
+        <p:txBody>
+          <a:bodyPr wrap="none" rtlCol="0">
+            <a:spAutoFit/>
+          </a:bodyPr>
+          <a:lstStyle/>
+          <a:p>
+            <a:r>
+              <a:rPr lang="en-US" sz="800" dirty="0" smtClean="0"/>
+              <a:t>1 thread</a:t>
+            </a:r>
+          </a:p>
+        </p:txBody>
+      </p:sp>
+      <p:grpSp>
+        <p:nvGrpSpPr>
+          <p:cNvPr id="252" name="Group 251"/>
+          <p:cNvGrpSpPr/>
+          <p:nvPr/>
+        </p:nvGrpSpPr>
+        <p:grpSpPr>
+          <a:xfrm>
+            <a:off x="1843364" y="5649055"/>
+            <a:ext cx="361436" cy="542219"/>
+            <a:chOff x="5039917" y="2158661"/>
+            <a:chExt cx="361436" cy="542219"/>
+          </a:xfrm>
+        </p:grpSpPr>
+        <p:cxnSp>
+          <p:nvCxnSpPr>
+            <p:cNvPr id="253" name="Straight Connector 252"/>
+            <p:cNvCxnSpPr/>
+            <p:nvPr/>
+          </p:nvCxnSpPr>
+          <p:spPr>
+            <a:xfrm rot="16200000">
+              <a:off x="5221326" y="2516564"/>
+              <a:ext cx="0" cy="360050"/>
+            </a:xfrm>
+            <a:prstGeom prst="line">
+              <a:avLst/>
+            </a:prstGeom>
+          </p:spPr>
+          <p:style>
+            <a:lnRef idx="1">
+              <a:schemeClr val="accent1"/>
+            </a:lnRef>
+            <a:fillRef idx="0">
+              <a:schemeClr val="accent1"/>
+            </a:fillRef>
+            <a:effectRef idx="0">
+              <a:schemeClr val="accent1"/>
+            </a:effectRef>
+            <a:fontRef idx="minor">
+              <a:schemeClr val="tx1"/>
+            </a:fontRef>
+          </p:style>
+        </p:cxnSp>
+        <p:cxnSp>
+          <p:nvCxnSpPr>
+            <p:cNvPr id="254" name="Straight Arrow Connector 253"/>
+            <p:cNvCxnSpPr/>
+            <p:nvPr/>
+          </p:nvCxnSpPr>
+          <p:spPr>
+            <a:xfrm rot="16200000" flipH="1">
+              <a:off x="4978403" y="2458648"/>
+              <a:ext cx="484464" cy="0"/>
+            </a:xfrm>
+            <a:prstGeom prst="straightConnector1">
+              <a:avLst/>
+            </a:prstGeom>
+            <a:ln>
+              <a:tailEnd type="arrow"/>
+            </a:ln>
+          </p:spPr>
+          <p:style>
+            <a:lnRef idx="1">
+              <a:schemeClr val="accent1"/>
+            </a:lnRef>
+            <a:fillRef idx="0">
+              <a:schemeClr val="accent1"/>
+            </a:fillRef>
+            <a:effectRef idx="0">
+              <a:schemeClr val="accent1"/>
+            </a:effectRef>
+            <a:fontRef idx="minor">
+              <a:schemeClr val="tx1"/>
+            </a:fontRef>
+          </p:style>
+        </p:cxnSp>
+        <p:cxnSp>
+          <p:nvCxnSpPr>
+            <p:cNvPr id="255" name="Straight Connector 254"/>
+            <p:cNvCxnSpPr/>
+            <p:nvPr/>
+          </p:nvCxnSpPr>
+          <p:spPr>
+            <a:xfrm flipH="1">
+              <a:off x="5400660" y="2160807"/>
+              <a:ext cx="693" cy="535782"/>
+            </a:xfrm>
+            <a:prstGeom prst="line">
+              <a:avLst/>
+            </a:prstGeom>
+          </p:spPr>
+          <p:style>
+            <a:lnRef idx="1">
+              <a:schemeClr val="accent1"/>
+            </a:lnRef>
+            <a:fillRef idx="0">
+              <a:schemeClr val="accent1"/>
+            </a:fillRef>
+            <a:effectRef idx="0">
+              <a:schemeClr val="accent1"/>
+            </a:effectRef>
+            <a:fontRef idx="minor">
+              <a:schemeClr val="tx1"/>
+            </a:fontRef>
+          </p:style>
+        </p:cxnSp>
+        <p:cxnSp>
+          <p:nvCxnSpPr>
+            <p:cNvPr id="256" name="Straight Connector 255"/>
+            <p:cNvCxnSpPr/>
+            <p:nvPr/>
+          </p:nvCxnSpPr>
+          <p:spPr>
+            <a:xfrm rot="16200000">
+              <a:off x="5220635" y="2428142"/>
+              <a:ext cx="0" cy="360050"/>
+            </a:xfrm>
+            <a:prstGeom prst="line">
+              <a:avLst/>
+            </a:prstGeom>
+          </p:spPr>
+          <p:style>
+            <a:lnRef idx="1">
+              <a:schemeClr val="accent1"/>
+            </a:lnRef>
+            <a:fillRef idx="0">
+              <a:schemeClr val="accent1"/>
+            </a:fillRef>
+            <a:effectRef idx="0">
+              <a:schemeClr val="accent1"/>
+            </a:effectRef>
+            <a:fontRef idx="minor">
+              <a:schemeClr val="tx1"/>
+            </a:fontRef>
+          </p:style>
+        </p:cxnSp>
+        <p:cxnSp>
+          <p:nvCxnSpPr>
+            <p:cNvPr id="257" name="Straight Connector 256"/>
+            <p:cNvCxnSpPr/>
+            <p:nvPr/>
+          </p:nvCxnSpPr>
+          <p:spPr>
+            <a:xfrm rot="16200000">
+              <a:off x="5221326" y="2338132"/>
+              <a:ext cx="0" cy="360050"/>
+            </a:xfrm>
+            <a:prstGeom prst="line">
+              <a:avLst/>
+            </a:prstGeom>
+          </p:spPr>
+          <p:style>
+            <a:lnRef idx="1">
+              <a:schemeClr val="accent1"/>
+            </a:lnRef>
+            <a:fillRef idx="0">
+              <a:schemeClr val="accent1"/>
+            </a:fillRef>
+            <a:effectRef idx="0">
+              <a:schemeClr val="accent1"/>
+            </a:effectRef>
+            <a:fontRef idx="minor">
+              <a:schemeClr val="tx1"/>
+            </a:fontRef>
+          </p:style>
+        </p:cxnSp>
+        <p:cxnSp>
+          <p:nvCxnSpPr>
+            <p:cNvPr id="258" name="Straight Connector 257"/>
+            <p:cNvCxnSpPr/>
+            <p:nvPr/>
+          </p:nvCxnSpPr>
+          <p:spPr>
+            <a:xfrm rot="16200000">
+              <a:off x="5221327" y="2246528"/>
+              <a:ext cx="0" cy="360050"/>
+            </a:xfrm>
+            <a:prstGeom prst="line">
+              <a:avLst/>
+            </a:prstGeom>
+          </p:spPr>
+          <p:style>
+            <a:lnRef idx="1">
+              <a:schemeClr val="accent1"/>
+            </a:lnRef>
+            <a:fillRef idx="0">
+              <a:schemeClr val="accent1"/>
+            </a:fillRef>
+            <a:effectRef idx="0">
+              <a:schemeClr val="accent1"/>
+            </a:effectRef>
+            <a:fontRef idx="minor">
+              <a:schemeClr val="tx1"/>
+            </a:fontRef>
+          </p:style>
+        </p:cxnSp>
+        <p:cxnSp>
+          <p:nvCxnSpPr>
+            <p:cNvPr id="259" name="Straight Connector 258"/>
+            <p:cNvCxnSpPr/>
+            <p:nvPr/>
+          </p:nvCxnSpPr>
+          <p:spPr>
+            <a:xfrm rot="16200000">
+              <a:off x="5220635" y="2158112"/>
+              <a:ext cx="0" cy="360050"/>
+            </a:xfrm>
+            <a:prstGeom prst="line">
+              <a:avLst/>
+            </a:prstGeom>
+          </p:spPr>
+          <p:style>
+            <a:lnRef idx="1">
+              <a:schemeClr val="accent1"/>
+            </a:lnRef>
+            <a:fillRef idx="0">
+              <a:schemeClr val="accent1"/>
+            </a:fillRef>
+            <a:effectRef idx="0">
+              <a:schemeClr val="accent1"/>
+            </a:effectRef>
+            <a:fontRef idx="minor">
+              <a:schemeClr val="tx1"/>
+            </a:fontRef>
+          </p:style>
+        </p:cxnSp>
+        <p:cxnSp>
+          <p:nvCxnSpPr>
+            <p:cNvPr id="260" name="Straight Connector 259"/>
+            <p:cNvCxnSpPr/>
+            <p:nvPr/>
+          </p:nvCxnSpPr>
+          <p:spPr>
+            <a:xfrm flipH="1">
+              <a:off x="5039917" y="2158661"/>
+              <a:ext cx="693" cy="535782"/>
+            </a:xfrm>
+            <a:prstGeom prst="line">
+              <a:avLst/>
+            </a:prstGeom>
+          </p:spPr>
+          <p:style>
+            <a:lnRef idx="1">
+              <a:schemeClr val="accent1"/>
+            </a:lnRef>
+            <a:fillRef idx="0">
+              <a:schemeClr val="accent1"/>
+            </a:fillRef>
+            <a:effectRef idx="0">
+              <a:schemeClr val="accent1"/>
+            </a:effectRef>
+            <a:fontRef idx="minor">
+              <a:schemeClr val="tx1"/>
+            </a:fontRef>
+          </p:style>
+        </p:cxnSp>
+      </p:grpSp>
+      <p:sp>
+        <p:nvSpPr>
+          <p:cNvPr id="261" name="TextBox 260"/>
+          <p:cNvSpPr txBox="1"/>
+          <p:nvPr/>
+        </p:nvSpPr>
+        <p:spPr>
+          <a:xfrm rot="5400000">
+            <a:off x="1888530" y="5839274"/>
+            <a:ext cx="1050288" cy="338554"/>
+          </a:xfrm>
+          <a:prstGeom prst="rect">
+            <a:avLst/>
+          </a:prstGeom>
+          <a:noFill/>
+        </p:spPr>
+        <p:txBody>
+          <a:bodyPr wrap="none" rtlCol="0">
+            <a:spAutoFit/>
+          </a:bodyPr>
+          <a:lstStyle/>
+          <a:p>
+            <a:r>
+              <a:rPr lang="en-US" sz="800" dirty="0" smtClean="0"/>
+              <a:t>Pack information </a:t>
+            </a:r>
+            <a:endParaRPr lang="en-US" sz="800" dirty="0"/>
+          </a:p>
+          <a:p>
+            <a:r>
+              <a:rPr lang="en-US" sz="800" dirty="0" smtClean="0"/>
+              <a:t>For </a:t>
+            </a:r>
+            <a:r>
+              <a:rPr lang="en-US" sz="800" dirty="0" err="1" smtClean="0"/>
+              <a:t>tapeserverd</a:t>
+            </a:r>
+            <a:r>
+              <a:rPr lang="en-US" sz="800" dirty="0" smtClean="0"/>
+              <a:t> and </a:t>
+            </a:r>
+          </a:p>
+        </p:txBody>
+      </p:sp>
+      <p:sp>
+        <p:nvSpPr>
+          <p:cNvPr id="262" name="Freeform 261"/>
+          <p:cNvSpPr/>
+          <p:nvPr/>
+        </p:nvSpPr>
+        <p:spPr>
+          <a:xfrm>
+            <a:off x="675864" y="4959015"/>
+            <a:ext cx="1318260" cy="1867566"/>
+          </a:xfrm>
+          <a:custGeom>
+            <a:avLst/>
+            <a:gdLst>
+              <a:gd name="connsiteX0" fmla="*/ 36812 w 1164572"/>
+              <a:gd name="connsiteY0" fmla="*/ 0 h 861060"/>
+              <a:gd name="connsiteX1" fmla="*/ 113012 w 1164572"/>
+              <a:gd name="connsiteY1" fmla="*/ 449580 h 861060"/>
+              <a:gd name="connsiteX2" fmla="*/ 981692 w 1164572"/>
+              <a:gd name="connsiteY2" fmla="*/ 533400 h 861060"/>
+              <a:gd name="connsiteX3" fmla="*/ 1164572 w 1164572"/>
+              <a:gd name="connsiteY3" fmla="*/ 861060 h 861060"/>
+              <a:gd name="connsiteX0" fmla="*/ 30698 w 1158458"/>
+              <a:gd name="connsiteY0" fmla="*/ 0 h 861060"/>
+              <a:gd name="connsiteX1" fmla="*/ 106898 w 1158458"/>
+              <a:gd name="connsiteY1" fmla="*/ 449580 h 861060"/>
+              <a:gd name="connsiteX2" fmla="*/ 975578 w 1158458"/>
+              <a:gd name="connsiteY2" fmla="*/ 533400 h 861060"/>
+              <a:gd name="connsiteX3" fmla="*/ 1158458 w 1158458"/>
+              <a:gd name="connsiteY3" fmla="*/ 861060 h 861060"/>
+              <a:gd name="connsiteX0" fmla="*/ 7458 w 1135218"/>
+              <a:gd name="connsiteY0" fmla="*/ 0 h 861060"/>
+              <a:gd name="connsiteX1" fmla="*/ 175098 w 1135218"/>
+              <a:gd name="connsiteY1" fmla="*/ 457200 h 861060"/>
+              <a:gd name="connsiteX2" fmla="*/ 952338 w 1135218"/>
+              <a:gd name="connsiteY2" fmla="*/ 533400 h 861060"/>
+              <a:gd name="connsiteX3" fmla="*/ 1135218 w 1135218"/>
+              <a:gd name="connsiteY3" fmla="*/ 861060 h 861060"/>
+              <a:gd name="connsiteX0" fmla="*/ 0 w 1127760"/>
+              <a:gd name="connsiteY0" fmla="*/ 0 h 861060"/>
+              <a:gd name="connsiteX1" fmla="*/ 167640 w 1127760"/>
+              <a:gd name="connsiteY1" fmla="*/ 457200 h 861060"/>
+              <a:gd name="connsiteX2" fmla="*/ 944880 w 1127760"/>
+              <a:gd name="connsiteY2" fmla="*/ 533400 h 861060"/>
+              <a:gd name="connsiteX3" fmla="*/ 1127760 w 1127760"/>
+              <a:gd name="connsiteY3" fmla="*/ 861060 h 861060"/>
+              <a:gd name="connsiteX0" fmla="*/ 0 w 1318260"/>
+              <a:gd name="connsiteY0" fmla="*/ 1426105 h 1460994"/>
+              <a:gd name="connsiteX1" fmla="*/ 358140 w 1318260"/>
+              <a:gd name="connsiteY1" fmla="*/ 89010 h 1460994"/>
+              <a:gd name="connsiteX2" fmla="*/ 1135380 w 1318260"/>
+              <a:gd name="connsiteY2" fmla="*/ 165210 h 1460994"/>
+              <a:gd name="connsiteX3" fmla="*/ 1318260 w 1318260"/>
+              <a:gd name="connsiteY3" fmla="*/ 492870 h 1460994"/>
+            </a:gdLst>
+            <a:ahLst/>
+            <a:cxnLst>
+              <a:cxn ang="0">
+                <a:pos x="connsiteX0" y="connsiteY0"/>
+              </a:cxn>
+              <a:cxn ang="0">
+                <a:pos x="connsiteX1" y="connsiteY1"/>
+              </a:cxn>
+              <a:cxn ang="0">
+                <a:pos x="connsiteX2" y="connsiteY2"/>
+              </a:cxn>
+              <a:cxn ang="0">
+                <a:pos x="connsiteX3" y="connsiteY3"/>
+              </a:cxn>
+            </a:cxnLst>
+            <a:rect l="l" t="t" r="r" b="b"/>
+            <a:pathLst>
+              <a:path w="1318260" h="1460994">
+                <a:moveTo>
+                  <a:pt x="0" y="1426105"/>
+                </a:moveTo>
+                <a:cubicBezTo>
+                  <a:pt x="5080" y="1697885"/>
+                  <a:pt x="168910" y="299159"/>
+                  <a:pt x="358140" y="89010"/>
+                </a:cubicBezTo>
+                <a:cubicBezTo>
+                  <a:pt x="547370" y="-121139"/>
+                  <a:pt x="975360" y="97900"/>
+                  <a:pt x="1135380" y="165210"/>
+                </a:cubicBezTo>
+                <a:cubicBezTo>
+                  <a:pt x="1295400" y="232520"/>
+                  <a:pt x="1314450" y="363330"/>
+                  <a:pt x="1318260" y="492870"/>
+                </a:cubicBezTo>
+              </a:path>
+            </a:pathLst>
+          </a:custGeom>
+          <a:ln>
+            <a:tailEnd type="arrow"/>
+          </a:ln>
+        </p:spPr>
+        <p:style>
+          <a:lnRef idx="1">
+            <a:schemeClr val="accent1"/>
+          </a:lnRef>
+          <a:fillRef idx="0">
+            <a:schemeClr val="accent1"/>
+          </a:fillRef>
+          <a:effectRef idx="0">
+            <a:schemeClr val="accent1"/>
+          </a:effectRef>
+          <a:fontRef idx="minor">
+            <a:schemeClr val="tx1"/>
+          </a:fontRef>
+        </p:style>
+        <p:txBody>
+          <a:bodyPr rtlCol="0" anchor="ctr"/>
+          <a:lstStyle/>
+          <a:p>
+            <a:pPr algn="ctr"/>
+            <a:endParaRPr lang="en-GB">
+              <a:solidFill>
+                <a:schemeClr val="tx1"/>
+              </a:solidFill>
+            </a:endParaRPr>
+          </a:p>
+        </p:txBody>
+      </p:sp>
+      <p:grpSp>
+        <p:nvGrpSpPr>
+          <p:cNvPr id="263" name="Group 262"/>
+          <p:cNvGrpSpPr/>
+          <p:nvPr/>
+        </p:nvGrpSpPr>
+        <p:grpSpPr>
+          <a:xfrm>
+            <a:off x="1608897" y="6730995"/>
+            <a:ext cx="180020" cy="180020"/>
+            <a:chOff x="1035165" y="1170180"/>
+            <a:chExt cx="180020" cy="180020"/>
+          </a:xfrm>
+        </p:grpSpPr>
+        <p:sp>
+          <p:nvSpPr>
+            <p:cNvPr id="264" name="Circular Arrow 263"/>
+            <p:cNvSpPr/>
+            <p:nvPr/>
+          </p:nvSpPr>
+          <p:spPr>
+            <a:xfrm>
+              <a:off x="1035165" y="1170180"/>
+              <a:ext cx="180020" cy="180020"/>
+            </a:xfrm>
+            <a:prstGeom prst="circularArrow">
+              <a:avLst/>
+            </a:prstGeom>
+            <a:ln>
+              <a:tailEnd type="arrow"/>
+            </a:ln>
+          </p:spPr>
+          <p:style>
+            <a:lnRef idx="1">
+              <a:schemeClr val="accent1"/>
+            </a:lnRef>
+            <a:fillRef idx="0">
+              <a:schemeClr val="accent1"/>
+            </a:fillRef>
+            <a:effectRef idx="0">
+              <a:schemeClr val="accent1"/>
+            </a:effectRef>
+            <a:fontRef idx="minor">
+              <a:schemeClr val="tx1"/>
+            </a:fontRef>
+          </p:style>
+          <p:txBody>
+            <a:bodyPr rtlCol="0" anchor="ctr"/>
+            <a:lstStyle/>
+            <a:p>
+              <a:pPr algn="ctr"/>
+              <a:endParaRPr lang="en-GB">
+                <a:solidFill>
+                  <a:schemeClr val="tx1"/>
+                </a:solidFill>
+              </a:endParaRPr>
+            </a:p>
+          </p:txBody>
+        </p:sp>
+        <p:sp>
+          <p:nvSpPr>
+            <p:cNvPr id="265" name="Circular Arrow 264"/>
+            <p:cNvSpPr/>
+            <p:nvPr/>
+          </p:nvSpPr>
+          <p:spPr>
+            <a:xfrm rot="10800000">
+              <a:off x="1035165" y="1170180"/>
+              <a:ext cx="180020" cy="180020"/>
+            </a:xfrm>
+            <a:prstGeom prst="circularArrow">
+              <a:avLst/>
+            </a:prstGeom>
+            <a:ln>
+              <a:tailEnd type="arrow"/>
+            </a:ln>
+          </p:spPr>
+          <p:style>
+            <a:lnRef idx="1">
+              <a:schemeClr val="accent1"/>
+            </a:lnRef>
+            <a:fillRef idx="0">
+              <a:schemeClr val="accent1"/>
+            </a:fillRef>
+            <a:effectRef idx="0">
+              <a:schemeClr val="accent1"/>
+            </a:effectRef>
+            <a:fontRef idx="minor">
+              <a:schemeClr val="tx1"/>
+            </a:fontRef>
+          </p:style>
+          <p:txBody>
+            <a:bodyPr rtlCol="0" anchor="ctr"/>
+            <a:lstStyle/>
+            <a:p>
+              <a:pPr algn="ctr"/>
+              <a:endParaRPr lang="en-GB">
+                <a:solidFill>
+                  <a:schemeClr val="tx1"/>
+                </a:solidFill>
+              </a:endParaRPr>
+            </a:p>
+          </p:txBody>
+        </p:sp>
+      </p:grpSp>
+      <p:sp>
+        <p:nvSpPr>
+          <p:cNvPr id="266" name="Freeform 265"/>
+          <p:cNvSpPr/>
+          <p:nvPr/>
+        </p:nvSpPr>
+        <p:spPr>
+          <a:xfrm rot="5400000">
+            <a:off x="3418869" y="3033027"/>
+            <a:ext cx="1350528" cy="3997040"/>
+          </a:xfrm>
+          <a:custGeom>
+            <a:avLst/>
+            <a:gdLst>
+              <a:gd name="connsiteX0" fmla="*/ 36812 w 1164572"/>
+              <a:gd name="connsiteY0" fmla="*/ 0 h 861060"/>
+              <a:gd name="connsiteX1" fmla="*/ 113012 w 1164572"/>
+              <a:gd name="connsiteY1" fmla="*/ 449580 h 861060"/>
+              <a:gd name="connsiteX2" fmla="*/ 981692 w 1164572"/>
+              <a:gd name="connsiteY2" fmla="*/ 533400 h 861060"/>
+              <a:gd name="connsiteX3" fmla="*/ 1164572 w 1164572"/>
+              <a:gd name="connsiteY3" fmla="*/ 861060 h 861060"/>
+              <a:gd name="connsiteX0" fmla="*/ 30698 w 1158458"/>
+              <a:gd name="connsiteY0" fmla="*/ 0 h 861060"/>
+              <a:gd name="connsiteX1" fmla="*/ 106898 w 1158458"/>
+              <a:gd name="connsiteY1" fmla="*/ 449580 h 861060"/>
+              <a:gd name="connsiteX2" fmla="*/ 975578 w 1158458"/>
+              <a:gd name="connsiteY2" fmla="*/ 533400 h 861060"/>
+              <a:gd name="connsiteX3" fmla="*/ 1158458 w 1158458"/>
+              <a:gd name="connsiteY3" fmla="*/ 861060 h 861060"/>
+              <a:gd name="connsiteX0" fmla="*/ 7458 w 1135218"/>
+              <a:gd name="connsiteY0" fmla="*/ 0 h 861060"/>
+              <a:gd name="connsiteX1" fmla="*/ 175098 w 1135218"/>
+              <a:gd name="connsiteY1" fmla="*/ 457200 h 861060"/>
+              <a:gd name="connsiteX2" fmla="*/ 952338 w 1135218"/>
+              <a:gd name="connsiteY2" fmla="*/ 533400 h 861060"/>
+              <a:gd name="connsiteX3" fmla="*/ 1135218 w 1135218"/>
+              <a:gd name="connsiteY3" fmla="*/ 861060 h 861060"/>
+              <a:gd name="connsiteX0" fmla="*/ 0 w 1127760"/>
+              <a:gd name="connsiteY0" fmla="*/ 0 h 861060"/>
+              <a:gd name="connsiteX1" fmla="*/ 167640 w 1127760"/>
+              <a:gd name="connsiteY1" fmla="*/ 457200 h 861060"/>
+              <a:gd name="connsiteX2" fmla="*/ 944880 w 1127760"/>
+              <a:gd name="connsiteY2" fmla="*/ 533400 h 861060"/>
+              <a:gd name="connsiteX3" fmla="*/ 1127760 w 1127760"/>
+              <a:gd name="connsiteY3" fmla="*/ 861060 h 861060"/>
+              <a:gd name="connsiteX0" fmla="*/ 0 w 1127760"/>
+              <a:gd name="connsiteY0" fmla="*/ 0 h 861544"/>
+              <a:gd name="connsiteX1" fmla="*/ 167640 w 1127760"/>
+              <a:gd name="connsiteY1" fmla="*/ 457200 h 861544"/>
+              <a:gd name="connsiteX2" fmla="*/ 944880 w 1127760"/>
+              <a:gd name="connsiteY2" fmla="*/ 533400 h 861544"/>
+              <a:gd name="connsiteX3" fmla="*/ 1127760 w 1127760"/>
+              <a:gd name="connsiteY3" fmla="*/ 861060 h 861544"/>
+              <a:gd name="connsiteX0" fmla="*/ 0 w 1127760"/>
+              <a:gd name="connsiteY0" fmla="*/ 0 h 876606"/>
+              <a:gd name="connsiteX1" fmla="*/ 167640 w 1127760"/>
+              <a:gd name="connsiteY1" fmla="*/ 457200 h 876606"/>
+              <a:gd name="connsiteX2" fmla="*/ 266703 w 1127760"/>
+              <a:gd name="connsiteY2" fmla="*/ 831455 h 876606"/>
+              <a:gd name="connsiteX3" fmla="*/ 1127760 w 1127760"/>
+              <a:gd name="connsiteY3" fmla="*/ 861060 h 876606"/>
+              <a:gd name="connsiteX0" fmla="*/ 3365 w 1131125"/>
+              <a:gd name="connsiteY0" fmla="*/ 0 h 876606"/>
+              <a:gd name="connsiteX1" fmla="*/ 26228 w 1131125"/>
+              <a:gd name="connsiteY1" fmla="*/ 409511 h 876606"/>
+              <a:gd name="connsiteX2" fmla="*/ 270068 w 1131125"/>
+              <a:gd name="connsiteY2" fmla="*/ 831455 h 876606"/>
+              <a:gd name="connsiteX3" fmla="*/ 1131125 w 1131125"/>
+              <a:gd name="connsiteY3" fmla="*/ 861060 h 876606"/>
+              <a:gd name="connsiteX0" fmla="*/ 57571 w 1185331"/>
+              <a:gd name="connsiteY0" fmla="*/ 0 h 876606"/>
+              <a:gd name="connsiteX1" fmla="*/ 11854 w 1185331"/>
+              <a:gd name="connsiteY1" fmla="*/ 403550 h 876606"/>
+              <a:gd name="connsiteX2" fmla="*/ 324274 w 1185331"/>
+              <a:gd name="connsiteY2" fmla="*/ 831455 h 876606"/>
+              <a:gd name="connsiteX3" fmla="*/ 1185331 w 1185331"/>
+              <a:gd name="connsiteY3" fmla="*/ 861060 h 876606"/>
+              <a:gd name="connsiteX0" fmla="*/ 0 w 1470660"/>
+              <a:gd name="connsiteY0" fmla="*/ 0 h 1866150"/>
+              <a:gd name="connsiteX1" fmla="*/ 297183 w 1470660"/>
+              <a:gd name="connsiteY1" fmla="*/ 1393094 h 1866150"/>
+              <a:gd name="connsiteX2" fmla="*/ 609603 w 1470660"/>
+              <a:gd name="connsiteY2" fmla="*/ 1820999 h 1866150"/>
+              <a:gd name="connsiteX3" fmla="*/ 1470660 w 1470660"/>
+              <a:gd name="connsiteY3" fmla="*/ 1850604 h 1866150"/>
+              <a:gd name="connsiteX0" fmla="*/ 0 w 1577338"/>
+              <a:gd name="connsiteY0" fmla="*/ 0 h 2182089"/>
+              <a:gd name="connsiteX1" fmla="*/ 403861 w 1577338"/>
+              <a:gd name="connsiteY1" fmla="*/ 1709033 h 2182089"/>
+              <a:gd name="connsiteX2" fmla="*/ 716281 w 1577338"/>
+              <a:gd name="connsiteY2" fmla="*/ 2136938 h 2182089"/>
+              <a:gd name="connsiteX3" fmla="*/ 1577338 w 1577338"/>
+              <a:gd name="connsiteY3" fmla="*/ 2166543 h 2182089"/>
+              <a:gd name="connsiteX0" fmla="*/ 0 w 1577338"/>
+              <a:gd name="connsiteY0" fmla="*/ 0 h 2182089"/>
+              <a:gd name="connsiteX1" fmla="*/ 716281 w 1577338"/>
+              <a:gd name="connsiteY1" fmla="*/ 2136938 h 2182089"/>
+              <a:gd name="connsiteX2" fmla="*/ 1577338 w 1577338"/>
+              <a:gd name="connsiteY2" fmla="*/ 2166543 h 2182089"/>
+              <a:gd name="connsiteX0" fmla="*/ 0 w 1577338"/>
+              <a:gd name="connsiteY0" fmla="*/ 0 h 2166971"/>
+              <a:gd name="connsiteX1" fmla="*/ 638976 w 1577338"/>
+              <a:gd name="connsiteY1" fmla="*/ 1802011 h 2166971"/>
+              <a:gd name="connsiteX2" fmla="*/ 1577338 w 1577338"/>
+              <a:gd name="connsiteY2" fmla="*/ 2166543 h 2166971"/>
+              <a:gd name="connsiteX0" fmla="*/ 0 w 1577338"/>
+              <a:gd name="connsiteY0" fmla="*/ 0 h 2166971"/>
+              <a:gd name="connsiteX1" fmla="*/ 638976 w 1577338"/>
+              <a:gd name="connsiteY1" fmla="*/ 1802011 h 2166971"/>
+              <a:gd name="connsiteX2" fmla="*/ 1577338 w 1577338"/>
+              <a:gd name="connsiteY2" fmla="*/ 2166543 h 2166971"/>
+              <a:gd name="connsiteX0" fmla="*/ 0 w 1577338"/>
+              <a:gd name="connsiteY0" fmla="*/ 0 h 2166966"/>
+              <a:gd name="connsiteX1" fmla="*/ 629316 w 1577338"/>
+              <a:gd name="connsiteY1" fmla="*/ 1797926 h 2166966"/>
+              <a:gd name="connsiteX2" fmla="*/ 1577338 w 1577338"/>
+              <a:gd name="connsiteY2" fmla="*/ 2166543 h 2166966"/>
+              <a:gd name="connsiteX0" fmla="*/ 0 w 1577338"/>
+              <a:gd name="connsiteY0" fmla="*/ 0 h 2166966"/>
+              <a:gd name="connsiteX1" fmla="*/ 629316 w 1577338"/>
+              <a:gd name="connsiteY1" fmla="*/ 1797926 h 2166966"/>
+              <a:gd name="connsiteX2" fmla="*/ 1577338 w 1577338"/>
+              <a:gd name="connsiteY2" fmla="*/ 2166543 h 2166966"/>
+              <a:gd name="connsiteX0" fmla="*/ 0 w 1577338"/>
+              <a:gd name="connsiteY0" fmla="*/ 0 h 2167041"/>
+              <a:gd name="connsiteX1" fmla="*/ 552008 w 1577338"/>
+              <a:gd name="connsiteY1" fmla="*/ 1846940 h 2167041"/>
+              <a:gd name="connsiteX2" fmla="*/ 1577338 w 1577338"/>
+              <a:gd name="connsiteY2" fmla="*/ 2166543 h 2167041"/>
+              <a:gd name="connsiteX0" fmla="*/ 0 w 1577338"/>
+              <a:gd name="connsiteY0" fmla="*/ 0 h 2166927"/>
+              <a:gd name="connsiteX1" fmla="*/ 503691 w 1577338"/>
+              <a:gd name="connsiteY1" fmla="*/ 1765251 h 2166927"/>
+              <a:gd name="connsiteX2" fmla="*/ 1577338 w 1577338"/>
+              <a:gd name="connsiteY2" fmla="*/ 2166543 h 2166927"/>
+              <a:gd name="connsiteX0" fmla="*/ 0 w 1867452"/>
+              <a:gd name="connsiteY0" fmla="*/ 0 h 2510022"/>
+              <a:gd name="connsiteX1" fmla="*/ 793805 w 1867452"/>
+              <a:gd name="connsiteY1" fmla="*/ 2108346 h 2510022"/>
+              <a:gd name="connsiteX2" fmla="*/ 1867452 w 1867452"/>
+              <a:gd name="connsiteY2" fmla="*/ 2509638 h 2510022"/>
+              <a:gd name="connsiteX0" fmla="*/ 0 w 1639505"/>
+              <a:gd name="connsiteY0" fmla="*/ 0 h 2162842"/>
+              <a:gd name="connsiteX1" fmla="*/ 565858 w 1639505"/>
+              <a:gd name="connsiteY1" fmla="*/ 1761166 h 2162842"/>
+              <a:gd name="connsiteX2" fmla="*/ 1639505 w 1639505"/>
+              <a:gd name="connsiteY2" fmla="*/ 2162458 h 2162842"/>
+              <a:gd name="connsiteX0" fmla="*/ 0 w 1639505"/>
+              <a:gd name="connsiteY0" fmla="*/ 68 h 2162910"/>
+              <a:gd name="connsiteX1" fmla="*/ 565858 w 1639505"/>
+              <a:gd name="connsiteY1" fmla="*/ 1761234 h 2162910"/>
+              <a:gd name="connsiteX2" fmla="*/ 1639505 w 1639505"/>
+              <a:gd name="connsiteY2" fmla="*/ 2162526 h 2162910"/>
+              <a:gd name="connsiteX0" fmla="*/ 0 w 1836368"/>
+              <a:gd name="connsiteY0" fmla="*/ 70 h 2142490"/>
+              <a:gd name="connsiteX1" fmla="*/ 762721 w 1836368"/>
+              <a:gd name="connsiteY1" fmla="*/ 1740814 h 2142490"/>
+              <a:gd name="connsiteX2" fmla="*/ 1836368 w 1836368"/>
+              <a:gd name="connsiteY2" fmla="*/ 2142106 h 2142490"/>
+            </a:gdLst>
+            <a:ahLst/>
+            <a:cxnLst>
+              <a:cxn ang="0">
+                <a:pos x="connsiteX0" y="connsiteY0"/>
+              </a:cxn>
+              <a:cxn ang="0">
+                <a:pos x="connsiteX1" y="connsiteY1"/>
+              </a:cxn>
+              <a:cxn ang="0">
+                <a:pos x="connsiteX2" y="connsiteY2"/>
+              </a:cxn>
+            </a:cxnLst>
+            <a:rect l="l" t="t" r="r" b="b"/>
+            <a:pathLst>
+              <a:path w="1836368" h="2142490">
+                <a:moveTo>
+                  <a:pt x="0" y="70"/>
+                </a:moveTo>
+                <a:cubicBezTo>
+                  <a:pt x="594761" y="-12195"/>
+                  <a:pt x="490171" y="1608454"/>
+                  <a:pt x="762721" y="1740814"/>
+                </a:cubicBezTo>
+                <a:cubicBezTo>
+                  <a:pt x="922741" y="1808124"/>
+                  <a:pt x="1527758" y="2155633"/>
+                  <a:pt x="1836368" y="2142106"/>
                 </a:cubicBezTo>
               </a:path>
             </a:pathLst>

</xml_diff>

<commit_message>
Minor fixes in threading diagrams (missing Memory manager name)
</commit_message>
<xml_diff>
--- a/castor/tape/tapeserver/documentation/images/MigrationMountMM.pptx
+++ b/castor/tape/tapeserver/documentation/images/MigrationMountMM.pptx
@@ -104,6 +104,22 @@
       </a:defRPr>
     </a:lvl9pPr>
   </p:defaultTextStyle>
+  <p:extLst>
+    <p:ext uri="{EFAFB233-063F-42B5-8137-9DF3F51BA10A}">
+      <p15:sldGuideLst xmlns:p15="http://schemas.microsoft.com/office/powerpoint/2012/main">
+        <p15:guide id="1" orient="horz" pos="2270">
+          <p15:clr>
+            <a:srgbClr val="A4A3A4"/>
+          </p15:clr>
+        </p15:guide>
+        <p15:guide id="2" pos="2269">
+          <p15:clr>
+            <a:srgbClr val="A4A3A4"/>
+          </p15:clr>
+        </p15:guide>
+      </p15:sldGuideLst>
+    </p:ext>
+  </p:extLst>
 </p:presentation>
 </file>
 
@@ -288,7 +304,7 @@
           <a:p>
             <a:fld id="{CBA86333-F23A-467F-8B51-1B0299BC507D}" type="datetimeFigureOut">
               <a:rPr lang="en-GB" smtClean="0"/>
-              <a:t>04/06/2014</a:t>
+              <a:t>18/09/2014</a:t>
             </a:fld>
             <a:endParaRPr lang="en-GB"/>
           </a:p>
@@ -458,7 +474,7 @@
           <a:p>
             <a:fld id="{CBA86333-F23A-467F-8B51-1B0299BC507D}" type="datetimeFigureOut">
               <a:rPr lang="en-GB" smtClean="0"/>
-              <a:t>04/06/2014</a:t>
+              <a:t>18/09/2014</a:t>
             </a:fld>
             <a:endParaRPr lang="en-GB"/>
           </a:p>
@@ -638,7 +654,7 @@
           <a:p>
             <a:fld id="{CBA86333-F23A-467F-8B51-1B0299BC507D}" type="datetimeFigureOut">
               <a:rPr lang="en-GB" smtClean="0"/>
-              <a:t>04/06/2014</a:t>
+              <a:t>18/09/2014</a:t>
             </a:fld>
             <a:endParaRPr lang="en-GB"/>
           </a:p>
@@ -808,7 +824,7 @@
           <a:p>
             <a:fld id="{CBA86333-F23A-467F-8B51-1B0299BC507D}" type="datetimeFigureOut">
               <a:rPr lang="en-GB" smtClean="0"/>
-              <a:t>04/06/2014</a:t>
+              <a:t>18/09/2014</a:t>
             </a:fld>
             <a:endParaRPr lang="en-GB"/>
           </a:p>
@@ -1054,7 +1070,7 @@
           <a:p>
             <a:fld id="{CBA86333-F23A-467F-8B51-1B0299BC507D}" type="datetimeFigureOut">
               <a:rPr lang="en-GB" smtClean="0"/>
-              <a:t>04/06/2014</a:t>
+              <a:t>18/09/2014</a:t>
             </a:fld>
             <a:endParaRPr lang="en-GB"/>
           </a:p>
@@ -1342,7 +1358,7 @@
           <a:p>
             <a:fld id="{CBA86333-F23A-467F-8B51-1B0299BC507D}" type="datetimeFigureOut">
               <a:rPr lang="en-GB" smtClean="0"/>
-              <a:t>04/06/2014</a:t>
+              <a:t>18/09/2014</a:t>
             </a:fld>
             <a:endParaRPr lang="en-GB"/>
           </a:p>
@@ -1769,7 +1785,7 @@
           <a:p>
             <a:fld id="{CBA86333-F23A-467F-8B51-1B0299BC507D}" type="datetimeFigureOut">
               <a:rPr lang="en-GB" smtClean="0"/>
-              <a:t>04/06/2014</a:t>
+              <a:t>18/09/2014</a:t>
             </a:fld>
             <a:endParaRPr lang="en-GB"/>
           </a:p>
@@ -1887,7 +1903,7 @@
           <a:p>
             <a:fld id="{CBA86333-F23A-467F-8B51-1B0299BC507D}" type="datetimeFigureOut">
               <a:rPr lang="en-GB" smtClean="0"/>
-              <a:t>04/06/2014</a:t>
+              <a:t>18/09/2014</a:t>
             </a:fld>
             <a:endParaRPr lang="en-GB"/>
           </a:p>
@@ -1982,7 +1998,7 @@
           <a:p>
             <a:fld id="{CBA86333-F23A-467F-8B51-1B0299BC507D}" type="datetimeFigureOut">
               <a:rPr lang="en-GB" smtClean="0"/>
-              <a:t>04/06/2014</a:t>
+              <a:t>18/09/2014</a:t>
             </a:fld>
             <a:endParaRPr lang="en-GB"/>
           </a:p>
@@ -2259,7 +2275,7 @@
           <a:p>
             <a:fld id="{CBA86333-F23A-467F-8B51-1B0299BC507D}" type="datetimeFigureOut">
               <a:rPr lang="en-GB" smtClean="0"/>
-              <a:t>04/06/2014</a:t>
+              <a:t>18/09/2014</a:t>
             </a:fld>
             <a:endParaRPr lang="en-GB"/>
           </a:p>
@@ -2512,7 +2528,7 @@
           <a:p>
             <a:fld id="{CBA86333-F23A-467F-8B51-1B0299BC507D}" type="datetimeFigureOut">
               <a:rPr lang="en-GB" smtClean="0"/>
-              <a:t>04/06/2014</a:t>
+              <a:t>18/09/2014</a:t>
             </a:fld>
             <a:endParaRPr lang="en-GB"/>
           </a:p>
@@ -2725,7 +2741,7 @@
           <a:p>
             <a:fld id="{CBA86333-F23A-467F-8B51-1B0299BC507D}" type="datetimeFigureOut">
               <a:rPr lang="en-GB" smtClean="0"/>
-              <a:t>04/06/2014</a:t>
+              <a:t>18/09/2014</a:t>
             </a:fld>
             <a:endParaRPr lang="en-GB"/>
           </a:p>
@@ -11217,6 +11233,36 @@
                 <a:schemeClr val="tx1"/>
               </a:solidFill>
             </a:endParaRPr>
+          </a:p>
+        </p:txBody>
+      </p:sp>
+      <p:sp>
+        <p:nvSpPr>
+          <p:cNvPr id="267" name="TextBox 266"/>
+          <p:cNvSpPr txBox="1"/>
+          <p:nvPr/>
+        </p:nvSpPr>
+        <p:spPr>
+          <a:xfrm>
+            <a:off x="2839769" y="988438"/>
+            <a:ext cx="1037463" cy="215444"/>
+          </a:xfrm>
+          <a:prstGeom prst="rect">
+            <a:avLst/>
+          </a:prstGeom>
+          <a:noFill/>
+        </p:spPr>
+        <p:txBody>
+          <a:bodyPr wrap="none" rtlCol="0">
+            <a:spAutoFit/>
+          </a:bodyPr>
+          <a:lstStyle/>
+          <a:p>
+            <a:r>
+              <a:rPr lang="en-US" sz="800" b="1" dirty="0" smtClean="0"/>
+              <a:t>Memory manager</a:t>
+            </a:r>
+            <a:endParaRPr lang="en-GB" sz="800" b="1" dirty="0"/>
           </a:p>
         </p:txBody>
       </p:sp>

</xml_diff>

<commit_message>
Minor fix on threading diagrams
</commit_message>
<xml_diff>
--- a/castor/tape/tapeserver/documentation/images/MigrationMountMM.pptx
+++ b/castor/tape/tapeserver/documentation/images/MigrationMountMM.pptx
@@ -304,7 +304,7 @@
           <a:p>
             <a:fld id="{CBA86333-F23A-467F-8B51-1B0299BC507D}" type="datetimeFigureOut">
               <a:rPr lang="en-GB" smtClean="0"/>
-              <a:t>18/09/2014</a:t>
+              <a:t>19/09/2014</a:t>
             </a:fld>
             <a:endParaRPr lang="en-GB"/>
           </a:p>
@@ -474,7 +474,7 @@
           <a:p>
             <a:fld id="{CBA86333-F23A-467F-8B51-1B0299BC507D}" type="datetimeFigureOut">
               <a:rPr lang="en-GB" smtClean="0"/>
-              <a:t>18/09/2014</a:t>
+              <a:t>19/09/2014</a:t>
             </a:fld>
             <a:endParaRPr lang="en-GB"/>
           </a:p>
@@ -654,7 +654,7 @@
           <a:p>
             <a:fld id="{CBA86333-F23A-467F-8B51-1B0299BC507D}" type="datetimeFigureOut">
               <a:rPr lang="en-GB" smtClean="0"/>
-              <a:t>18/09/2014</a:t>
+              <a:t>19/09/2014</a:t>
             </a:fld>
             <a:endParaRPr lang="en-GB"/>
           </a:p>
@@ -824,7 +824,7 @@
           <a:p>
             <a:fld id="{CBA86333-F23A-467F-8B51-1B0299BC507D}" type="datetimeFigureOut">
               <a:rPr lang="en-GB" smtClean="0"/>
-              <a:t>18/09/2014</a:t>
+              <a:t>19/09/2014</a:t>
             </a:fld>
             <a:endParaRPr lang="en-GB"/>
           </a:p>
@@ -1070,7 +1070,7 @@
           <a:p>
             <a:fld id="{CBA86333-F23A-467F-8B51-1B0299BC507D}" type="datetimeFigureOut">
               <a:rPr lang="en-GB" smtClean="0"/>
-              <a:t>18/09/2014</a:t>
+              <a:t>19/09/2014</a:t>
             </a:fld>
             <a:endParaRPr lang="en-GB"/>
           </a:p>
@@ -1358,7 +1358,7 @@
           <a:p>
             <a:fld id="{CBA86333-F23A-467F-8B51-1B0299BC507D}" type="datetimeFigureOut">
               <a:rPr lang="en-GB" smtClean="0"/>
-              <a:t>18/09/2014</a:t>
+              <a:t>19/09/2014</a:t>
             </a:fld>
             <a:endParaRPr lang="en-GB"/>
           </a:p>
@@ -1785,7 +1785,7 @@
           <a:p>
             <a:fld id="{CBA86333-F23A-467F-8B51-1B0299BC507D}" type="datetimeFigureOut">
               <a:rPr lang="en-GB" smtClean="0"/>
-              <a:t>18/09/2014</a:t>
+              <a:t>19/09/2014</a:t>
             </a:fld>
             <a:endParaRPr lang="en-GB"/>
           </a:p>
@@ -1903,7 +1903,7 @@
           <a:p>
             <a:fld id="{CBA86333-F23A-467F-8B51-1B0299BC507D}" type="datetimeFigureOut">
               <a:rPr lang="en-GB" smtClean="0"/>
-              <a:t>18/09/2014</a:t>
+              <a:t>19/09/2014</a:t>
             </a:fld>
             <a:endParaRPr lang="en-GB"/>
           </a:p>
@@ -1998,7 +1998,7 @@
           <a:p>
             <a:fld id="{CBA86333-F23A-467F-8B51-1B0299BC507D}" type="datetimeFigureOut">
               <a:rPr lang="en-GB" smtClean="0"/>
-              <a:t>18/09/2014</a:t>
+              <a:t>19/09/2014</a:t>
             </a:fld>
             <a:endParaRPr lang="en-GB"/>
           </a:p>
@@ -2275,7 +2275,7 @@
           <a:p>
             <a:fld id="{CBA86333-F23A-467F-8B51-1B0299BC507D}" type="datetimeFigureOut">
               <a:rPr lang="en-GB" smtClean="0"/>
-              <a:t>18/09/2014</a:t>
+              <a:t>19/09/2014</a:t>
             </a:fld>
             <a:endParaRPr lang="en-GB"/>
           </a:p>
@@ -2528,7 +2528,7 @@
           <a:p>
             <a:fld id="{CBA86333-F23A-467F-8B51-1B0299BC507D}" type="datetimeFigureOut">
               <a:rPr lang="en-GB" smtClean="0"/>
-              <a:t>18/09/2014</a:t>
+              <a:t>19/09/2014</a:t>
             </a:fld>
             <a:endParaRPr lang="en-GB"/>
           </a:p>
@@ -2741,7 +2741,7 @@
           <a:p>
             <a:fld id="{CBA86333-F23A-467F-8B51-1B0299BC507D}" type="datetimeFigureOut">
               <a:rPr lang="en-GB" smtClean="0"/>
-              <a:t>18/09/2014</a:t>
+              <a:t>19/09/2014</a:t>
             </a:fld>
             <a:endParaRPr lang="en-GB"/>
           </a:p>
@@ -3936,7 +3936,7 @@
         <p:spPr>
           <a:xfrm>
             <a:off x="50687" y="100417"/>
-            <a:ext cx="1930337" cy="215444"/>
+            <a:ext cx="1981633" cy="215444"/>
           </a:xfrm>
           <a:prstGeom prst="rect">
             <a:avLst/>
@@ -3951,15 +3951,11 @@
           <a:p>
             <a:r>
               <a:rPr lang="en-US" sz="800" b="1" dirty="0" smtClean="0"/>
-              <a:t>Migration </a:t>
-            </a:r>
-            <a:r>
-              <a:rPr lang="en-US" sz="800" b="1" smtClean="0"/>
-              <a:t>Mount Manager </a:t>
+              <a:t>Migration Mount Manager (main thread</a:t>
             </a:r>
             <a:r>
               <a:rPr lang="en-US" sz="800" b="1" dirty="0" smtClean="0"/>
-              <a:t>(main thread)</a:t>
+              <a:t>)*</a:t>
             </a:r>
             <a:endParaRPr lang="en-GB" sz="800" b="1" dirty="0"/>
           </a:p>
@@ -10747,8 +10743,8 @@
         </p:nvSpPr>
         <p:spPr>
           <a:xfrm rot="5400000">
-            <a:off x="1888530" y="5839274"/>
-            <a:ext cx="1050288" cy="338554"/>
+            <a:off x="1734176" y="5882221"/>
+            <a:ext cx="1358998" cy="338554"/>
           </a:xfrm>
           <a:prstGeom prst="rect">
             <a:avLst/>
@@ -10756,7 +10752,7 @@
           <a:noFill/>
         </p:spPr>
         <p:txBody>
-          <a:bodyPr wrap="none" rtlCol="0">
+          <a:bodyPr wrap="square" rtlCol="0">
             <a:spAutoFit/>
           </a:bodyPr>
           <a:lstStyle/>
@@ -10765,12 +10761,9 @@
               <a:rPr lang="en-US" sz="800" dirty="0" smtClean="0"/>
               <a:t>Pack information </a:t>
             </a:r>
-            <a:endParaRPr lang="en-US" sz="800" dirty="0"/>
-          </a:p>
-          <a:p>
             <a:r>
               <a:rPr lang="en-US" sz="800" dirty="0" smtClean="0"/>
-              <a:t>For </a:t>
+              <a:t>for </a:t>
             </a:r>
             <a:r>
               <a:rPr lang="en-US" sz="800" dirty="0" err="1" smtClean="0"/>
@@ -10778,8 +10771,13 @@
             </a:r>
             <a:r>
               <a:rPr lang="en-US" sz="800" dirty="0" smtClean="0"/>
-              <a:t> and </a:t>
-            </a:r>
+              <a:t> </a:t>
+            </a:r>
+            <a:r>
+              <a:rPr lang="en-US" sz="800" dirty="0" smtClean="0"/>
+              <a:t>and send </a:t>
+            </a:r>
+            <a:endParaRPr lang="en-US" sz="800" dirty="0" smtClean="0"/>
           </a:p>
         </p:txBody>
       </p:sp>
@@ -10791,8 +10789,8 @@
         </p:nvSpPr>
         <p:spPr>
           <a:xfrm>
-            <a:off x="675864" y="4959015"/>
-            <a:ext cx="1318260" cy="1867566"/>
+            <a:off x="745020" y="5021738"/>
+            <a:ext cx="1249104" cy="907317"/>
           </a:xfrm>
           <a:custGeom>
             <a:avLst/>
@@ -10837,6 +10835,22 @@
               <a:gd name="connsiteY2" fmla="*/ 165210 h 1460994"/>
               <a:gd name="connsiteX3" fmla="*/ 1318260 w 1318260"/>
               <a:gd name="connsiteY3" fmla="*/ 492870 h 1460994"/>
+              <a:gd name="connsiteX0" fmla="*/ 0 w 1249104"/>
+              <a:gd name="connsiteY0" fmla="*/ 709793 h 763521"/>
+              <a:gd name="connsiteX1" fmla="*/ 288984 w 1249104"/>
+              <a:gd name="connsiteY1" fmla="*/ 39942 h 763521"/>
+              <a:gd name="connsiteX2" fmla="*/ 1066224 w 1249104"/>
+              <a:gd name="connsiteY2" fmla="*/ 116142 h 763521"/>
+              <a:gd name="connsiteX3" fmla="*/ 1249104 w 1249104"/>
+              <a:gd name="connsiteY3" fmla="*/ 443802 h 763521"/>
+              <a:gd name="connsiteX0" fmla="*/ 0 w 1249104"/>
+              <a:gd name="connsiteY0" fmla="*/ 709793 h 709793"/>
+              <a:gd name="connsiteX1" fmla="*/ 288984 w 1249104"/>
+              <a:gd name="connsiteY1" fmla="*/ 39942 h 709793"/>
+              <a:gd name="connsiteX2" fmla="*/ 1066224 w 1249104"/>
+              <a:gd name="connsiteY2" fmla="*/ 116142 h 709793"/>
+              <a:gd name="connsiteX3" fmla="*/ 1249104 w 1249104"/>
+              <a:gd name="connsiteY3" fmla="*/ 443802 h 709793"/>
             </a:gdLst>
             <a:ahLst/>
             <a:cxnLst>
@@ -10855,24 +10869,24 @@
             </a:cxnLst>
             <a:rect l="l" t="t" r="r" b="b"/>
             <a:pathLst>
-              <a:path w="1318260" h="1460994">
+              <a:path w="1249104" h="709793">
                 <a:moveTo>
-                  <a:pt x="0" y="1426105"/>
+                  <a:pt x="0" y="709793"/>
                 </a:moveTo>
                 <a:cubicBezTo>
-                  <a:pt x="5080" y="1697885"/>
-                  <a:pt x="168910" y="299159"/>
-                  <a:pt x="358140" y="89010"/>
+                  <a:pt x="66552" y="476633"/>
+                  <a:pt x="111280" y="138884"/>
+                  <a:pt x="288984" y="39942"/>
                 </a:cubicBezTo>
                 <a:cubicBezTo>
-                  <a:pt x="547370" y="-121139"/>
-                  <a:pt x="975360" y="97900"/>
-                  <a:pt x="1135380" y="165210"/>
+                  <a:pt x="466688" y="-59000"/>
+                  <a:pt x="906204" y="48832"/>
+                  <a:pt x="1066224" y="116142"/>
                 </a:cubicBezTo>
                 <a:cubicBezTo>
-                  <a:pt x="1295400" y="232520"/>
-                  <a:pt x="1314450" y="363330"/>
-                  <a:pt x="1318260" y="492870"/>
+                  <a:pt x="1226244" y="183452"/>
+                  <a:pt x="1245294" y="314262"/>
+                  <a:pt x="1249104" y="443802"/>
                 </a:cubicBezTo>
               </a:path>
             </a:pathLst>
@@ -11261,6 +11275,44 @@
             <a:r>
               <a:rPr lang="en-US" sz="800" b="1" dirty="0" smtClean="0"/>
               <a:t>Memory manager</a:t>
+            </a:r>
+            <a:endParaRPr lang="en-GB" sz="800" b="1" dirty="0"/>
+          </a:p>
+        </p:txBody>
+      </p:sp>
+      <p:sp>
+        <p:nvSpPr>
+          <p:cNvPr id="268" name="TextBox 267"/>
+          <p:cNvSpPr txBox="1"/>
+          <p:nvPr/>
+        </p:nvSpPr>
+        <p:spPr>
+          <a:xfrm>
+            <a:off x="312266" y="5892171"/>
+            <a:ext cx="821059" cy="215444"/>
+          </a:xfrm>
+          <a:prstGeom prst="rect">
+            <a:avLst/>
+          </a:prstGeom>
+          <a:noFill/>
+        </p:spPr>
+        <p:txBody>
+          <a:bodyPr wrap="none" rtlCol="0">
+            <a:spAutoFit/>
+          </a:bodyPr>
+          <a:lstStyle/>
+          <a:p>
+            <a:r>
+              <a:rPr lang="en-US" sz="800" b="1" dirty="0" smtClean="0"/>
+              <a:t>(</a:t>
+            </a:r>
+            <a:r>
+              <a:rPr lang="en-US" sz="800" b="1" dirty="0" smtClean="0"/>
+              <a:t>main thread</a:t>
+            </a:r>
+            <a:r>
+              <a:rPr lang="en-US" sz="800" b="1" dirty="0" smtClean="0"/>
+              <a:t>)*</a:t>
             </a:r>
             <a:endParaRPr lang="en-GB" sz="800" b="1" dirty="0"/>
           </a:p>

</xml_diff>